<commit_message>
added a few lines on the last slide
</commit_message>
<xml_diff>
--- a/docs/PokemonTool.pptx
+++ b/docs/PokemonTool.pptx
@@ -109,6 +109,22 @@
       </a:defRPr>
     </a:lvl9pPr>
   </p:defaultTextStyle>
+  <p:extLst>
+    <p:ext uri="{EFAFB233-063F-42B5-8137-9DF3F51BA10A}">
+      <p15:sldGuideLst xmlns:p15="http://schemas.microsoft.com/office/powerpoint/2012/main">
+        <p15:guide id="1" orient="horz" pos="2160">
+          <p15:clr>
+            <a:srgbClr val="A4A3A4"/>
+          </p15:clr>
+        </p15:guide>
+        <p15:guide id="2" pos="2880">
+          <p15:clr>
+            <a:srgbClr val="A4A3A4"/>
+          </p15:clr>
+        </p15:guide>
+      </p15:sldGuideLst>
+    </p:ext>
+  </p:extLst>
 </p:presentation>
 </file>
 
@@ -248,7 +264,7 @@
               <a:rPr lang="en-US" smtClean="0"/>
               <a:t>8/10/2015</a:t>
             </a:fld>
-            <a:endParaRPr lang="en-US"/>
+            <a:endParaRPr lang="en-US" dirty="0"/>
           </a:p>
         </p:txBody>
       </p:sp>
@@ -269,7 +285,7 @@
             <a:extLst/>
           </a:lstStyle>
           <a:p>
-            <a:endParaRPr lang="en-US"/>
+            <a:endParaRPr lang="en-US" dirty="0"/>
           </a:p>
         </p:txBody>
       </p:sp>
@@ -294,7 +310,7 @@
               <a:rPr lang="en-US" smtClean="0"/>
               <a:t>‹#›</a:t>
             </a:fld>
-            <a:endParaRPr lang="en-US"/>
+            <a:endParaRPr lang="en-US" dirty="0"/>
           </a:p>
         </p:txBody>
       </p:sp>
@@ -381,7 +397,7 @@
           </a:lstStyle>
           <a:p>
             <a:pPr algn="ctr" eaLnBrk="1" latinLnBrk="0" hangingPunct="1"/>
-            <a:endParaRPr kumimoji="0" lang="en-US"/>
+            <a:endParaRPr kumimoji="0" lang="en-US" dirty="0"/>
           </a:p>
         </p:txBody>
       </p:sp>
@@ -432,7 +448,7 @@
           </a:lstStyle>
           <a:p>
             <a:pPr algn="ctr" eaLnBrk="1" latinLnBrk="0" hangingPunct="1"/>
-            <a:endParaRPr kumimoji="0" lang="en-US"/>
+            <a:endParaRPr kumimoji="0" lang="en-US" dirty="0"/>
           </a:p>
         </p:txBody>
       </p:sp>
@@ -561,7 +577,7 @@
               <a:rPr lang="en-US" smtClean="0"/>
               <a:t>8/10/2015</a:t>
             </a:fld>
-            <a:endParaRPr lang="en-US"/>
+            <a:endParaRPr lang="en-US" dirty="0"/>
           </a:p>
         </p:txBody>
       </p:sp>
@@ -582,7 +598,7 @@
             <a:extLst/>
           </a:lstStyle>
           <a:p>
-            <a:endParaRPr lang="en-US"/>
+            <a:endParaRPr lang="en-US" dirty="0"/>
           </a:p>
         </p:txBody>
       </p:sp>
@@ -607,7 +623,7 @@
               <a:rPr lang="en-US" smtClean="0"/>
               <a:t>‹#›</a:t>
             </a:fld>
-            <a:endParaRPr lang="en-US"/>
+            <a:endParaRPr lang="en-US" dirty="0"/>
           </a:p>
         </p:txBody>
       </p:sp>
@@ -746,7 +762,7 @@
               <a:rPr lang="en-US" smtClean="0"/>
               <a:t>8/10/2015</a:t>
             </a:fld>
-            <a:endParaRPr lang="en-US"/>
+            <a:endParaRPr lang="en-US" dirty="0"/>
           </a:p>
         </p:txBody>
       </p:sp>
@@ -767,7 +783,7 @@
             <a:extLst/>
           </a:lstStyle>
           <a:p>
-            <a:endParaRPr lang="en-US"/>
+            <a:endParaRPr lang="en-US" dirty="0"/>
           </a:p>
         </p:txBody>
       </p:sp>
@@ -792,7 +808,7 @@
               <a:rPr lang="en-US" smtClean="0"/>
               <a:t>‹#›</a:t>
             </a:fld>
-            <a:endParaRPr lang="en-US"/>
+            <a:endParaRPr lang="en-US" dirty="0"/>
           </a:p>
         </p:txBody>
       </p:sp>
@@ -921,7 +937,7 @@
               <a:rPr lang="en-US" smtClean="0"/>
               <a:t>8/10/2015</a:t>
             </a:fld>
-            <a:endParaRPr lang="en-US"/>
+            <a:endParaRPr lang="en-US" dirty="0"/>
           </a:p>
         </p:txBody>
       </p:sp>
@@ -942,7 +958,7 @@
             <a:extLst/>
           </a:lstStyle>
           <a:p>
-            <a:endParaRPr lang="en-US"/>
+            <a:endParaRPr lang="en-US" dirty="0"/>
           </a:p>
         </p:txBody>
       </p:sp>
@@ -967,7 +983,7 @@
               <a:rPr lang="en-US" smtClean="0"/>
               <a:t>‹#›</a:t>
             </a:fld>
-            <a:endParaRPr lang="en-US"/>
+            <a:endParaRPr lang="en-US" dirty="0"/>
           </a:p>
         </p:txBody>
       </p:sp>
@@ -1040,7 +1056,7 @@
           </a:lstStyle>
           <a:p>
             <a:pPr algn="ctr" eaLnBrk="1" latinLnBrk="0" hangingPunct="1"/>
-            <a:endParaRPr kumimoji="0" lang="en-US"/>
+            <a:endParaRPr kumimoji="0" lang="en-US" dirty="0"/>
           </a:p>
         </p:txBody>
       </p:sp>
@@ -1189,7 +1205,7 @@
               <a:rPr lang="en-US" smtClean="0"/>
               <a:t>8/10/2015</a:t>
             </a:fld>
-            <a:endParaRPr lang="en-US"/>
+            <a:endParaRPr lang="en-US" dirty="0"/>
           </a:p>
         </p:txBody>
       </p:sp>
@@ -1210,7 +1226,7 @@
             <a:extLst/>
           </a:lstStyle>
           <a:p>
-            <a:endParaRPr lang="en-US"/>
+            <a:endParaRPr lang="en-US" dirty="0"/>
           </a:p>
         </p:txBody>
       </p:sp>
@@ -1235,7 +1251,7 @@
               <a:rPr lang="en-US" smtClean="0"/>
               <a:t>‹#›</a:t>
             </a:fld>
-            <a:endParaRPr lang="en-US"/>
+            <a:endParaRPr lang="en-US" dirty="0"/>
           </a:p>
         </p:txBody>
       </p:sp>
@@ -1291,7 +1307,7 @@
           </a:lstStyle>
           <a:p>
             <a:pPr algn="ctr" eaLnBrk="1" latinLnBrk="0" hangingPunct="1"/>
-            <a:endParaRPr kumimoji="0" lang="en-US"/>
+            <a:endParaRPr kumimoji="0" lang="en-US" dirty="0"/>
           </a:p>
         </p:txBody>
       </p:sp>
@@ -1378,7 +1394,7 @@
           </a:lstStyle>
           <a:p>
             <a:pPr algn="ctr" eaLnBrk="1" latinLnBrk="0" hangingPunct="1"/>
-            <a:endParaRPr kumimoji="0" lang="en-US"/>
+            <a:endParaRPr kumimoji="0" lang="en-US" dirty="0"/>
           </a:p>
         </p:txBody>
       </p:sp>
@@ -1429,7 +1445,7 @@
           </a:lstStyle>
           <a:p>
             <a:pPr algn="ctr" eaLnBrk="1" latinLnBrk="0" hangingPunct="1"/>
-            <a:endParaRPr kumimoji="0" lang="en-US"/>
+            <a:endParaRPr kumimoji="0" lang="en-US" dirty="0"/>
           </a:p>
         </p:txBody>
       </p:sp>
@@ -1657,7 +1673,7 @@
               <a:rPr lang="en-US" smtClean="0"/>
               <a:t>8/10/2015</a:t>
             </a:fld>
-            <a:endParaRPr lang="en-US"/>
+            <a:endParaRPr lang="en-US" dirty="0"/>
           </a:p>
         </p:txBody>
       </p:sp>
@@ -1678,7 +1694,7 @@
             <a:extLst/>
           </a:lstStyle>
           <a:p>
-            <a:endParaRPr lang="en-US"/>
+            <a:endParaRPr lang="en-US" dirty="0"/>
           </a:p>
         </p:txBody>
       </p:sp>
@@ -1703,7 +1719,7 @@
               <a:rPr lang="en-US" smtClean="0"/>
               <a:t>‹#›</a:t>
             </a:fld>
-            <a:endParaRPr lang="en-US"/>
+            <a:endParaRPr lang="en-US" dirty="0"/>
           </a:p>
         </p:txBody>
       </p:sp>
@@ -2146,7 +2162,7 @@
               <a:rPr lang="en-US" smtClean="0"/>
               <a:t>8/10/2015</a:t>
             </a:fld>
-            <a:endParaRPr lang="en-US"/>
+            <a:endParaRPr lang="en-US" dirty="0"/>
           </a:p>
         </p:txBody>
       </p:sp>
@@ -2167,7 +2183,7 @@
             <a:extLst/>
           </a:lstStyle>
           <a:p>
-            <a:endParaRPr lang="en-US"/>
+            <a:endParaRPr lang="en-US" dirty="0"/>
           </a:p>
         </p:txBody>
       </p:sp>
@@ -2192,7 +2208,7 @@
               <a:rPr lang="en-US" smtClean="0"/>
               <a:t>‹#›</a:t>
             </a:fld>
-            <a:endParaRPr lang="en-US"/>
+            <a:endParaRPr lang="en-US" dirty="0"/>
           </a:p>
         </p:txBody>
       </p:sp>
@@ -2272,7 +2288,7 @@
               <a:rPr lang="en-US" smtClean="0"/>
               <a:t>8/10/2015</a:t>
             </a:fld>
-            <a:endParaRPr lang="en-US"/>
+            <a:endParaRPr lang="en-US" dirty="0"/>
           </a:p>
         </p:txBody>
       </p:sp>
@@ -2293,7 +2309,7 @@
             <a:extLst/>
           </a:lstStyle>
           <a:p>
-            <a:endParaRPr lang="en-US"/>
+            <a:endParaRPr lang="en-US" dirty="0"/>
           </a:p>
         </p:txBody>
       </p:sp>
@@ -2318,7 +2334,7 @@
               <a:rPr lang="en-US" smtClean="0"/>
               <a:t>‹#›</a:t>
             </a:fld>
-            <a:endParaRPr lang="en-US"/>
+            <a:endParaRPr lang="en-US" dirty="0"/>
           </a:p>
         </p:txBody>
       </p:sp>
@@ -2391,7 +2407,7 @@
           </a:lstStyle>
           <a:p>
             <a:pPr algn="ctr" eaLnBrk="1" latinLnBrk="0" hangingPunct="1"/>
-            <a:endParaRPr kumimoji="0" lang="en-US"/>
+            <a:endParaRPr kumimoji="0" lang="en-US" dirty="0"/>
           </a:p>
         </p:txBody>
       </p:sp>
@@ -2416,7 +2432,7 @@
               <a:rPr lang="en-US" smtClean="0"/>
               <a:t>8/10/2015</a:t>
             </a:fld>
-            <a:endParaRPr lang="en-US"/>
+            <a:endParaRPr lang="en-US" dirty="0"/>
           </a:p>
         </p:txBody>
       </p:sp>
@@ -2437,7 +2453,7 @@
             <a:extLst/>
           </a:lstStyle>
           <a:p>
-            <a:endParaRPr lang="en-US"/>
+            <a:endParaRPr lang="en-US" dirty="0"/>
           </a:p>
         </p:txBody>
       </p:sp>
@@ -2462,7 +2478,7 @@
               <a:rPr lang="en-US" smtClean="0"/>
               <a:t>‹#›</a:t>
             </a:fld>
-            <a:endParaRPr lang="en-US"/>
+            <a:endParaRPr lang="en-US" dirty="0"/>
           </a:p>
         </p:txBody>
       </p:sp>
@@ -2518,7 +2534,7 @@
           </a:lstStyle>
           <a:p>
             <a:pPr algn="ctr" eaLnBrk="1" latinLnBrk="0" hangingPunct="1"/>
-            <a:endParaRPr kumimoji="0" lang="en-US"/>
+            <a:endParaRPr kumimoji="0" lang="en-US" dirty="0"/>
           </a:p>
         </p:txBody>
       </p:sp>
@@ -2738,7 +2754,7 @@
               <a:rPr lang="en-US" smtClean="0"/>
               <a:t>8/10/2015</a:t>
             </a:fld>
-            <a:endParaRPr lang="en-US"/>
+            <a:endParaRPr lang="en-US" dirty="0"/>
           </a:p>
         </p:txBody>
       </p:sp>
@@ -2759,7 +2775,7 @@
             <a:extLst/>
           </a:lstStyle>
           <a:p>
-            <a:endParaRPr lang="en-US"/>
+            <a:endParaRPr lang="en-US" dirty="0"/>
           </a:p>
         </p:txBody>
       </p:sp>
@@ -2784,7 +2800,7 @@
               <a:rPr lang="en-US" smtClean="0"/>
               <a:t>‹#›</a:t>
             </a:fld>
-            <a:endParaRPr lang="en-US"/>
+            <a:endParaRPr lang="en-US" dirty="0"/>
           </a:p>
         </p:txBody>
       </p:sp>
@@ -2872,7 +2888,7 @@
               <a:rPr lang="en-US" smtClean="0"/>
               <a:t>8/10/2015</a:t>
             </a:fld>
-            <a:endParaRPr lang="en-US"/>
+            <a:endParaRPr lang="en-US" dirty="0"/>
           </a:p>
         </p:txBody>
       </p:sp>
@@ -2893,7 +2909,7 @@
             <a:extLst/>
           </a:lstStyle>
           <a:p>
-            <a:endParaRPr lang="en-US"/>
+            <a:endParaRPr lang="en-US" dirty="0"/>
           </a:p>
         </p:txBody>
       </p:sp>
@@ -2918,7 +2934,7 @@
               <a:rPr lang="en-US" smtClean="0"/>
               <a:t>‹#›</a:t>
             </a:fld>
-            <a:endParaRPr lang="en-US"/>
+            <a:endParaRPr lang="en-US" dirty="0"/>
           </a:p>
         </p:txBody>
       </p:sp>
@@ -2987,7 +3003,7 @@
               <a:buFont typeface="Wingdings 2"/>
               <a:buNone/>
             </a:pPr>
-            <a:endParaRPr kumimoji="0" lang="en-US" sz="3200" kern="1200">
+            <a:endParaRPr kumimoji="0" lang="en-US" sz="3200" kern="1200" dirty="0">
               <a:solidFill>
                 <a:schemeClr val="tx1"/>
               </a:solidFill>
@@ -3039,7 +3055,7 @@
           <a:p>
             <a:pPr marL="0" algn="l" eaLnBrk="1" latinLnBrk="0" hangingPunct="1"/>
             <a:r>
-              <a:rPr kumimoji="0" lang="en-US" smtClean="0"/>
+              <a:rPr kumimoji="0" lang="en-US" dirty="0" smtClean="0"/>
               <a:t>Click icon to add picture</a:t>
             </a:r>
             <a:endParaRPr kumimoji="0" lang="en-US" dirty="0"/>
@@ -3104,7 +3120,7 @@
           </a:lstStyle>
           <a:p>
             <a:pPr algn="ctr" eaLnBrk="1" latinLnBrk="0" hangingPunct="1"/>
-            <a:endParaRPr kumimoji="0" lang="en-US"/>
+            <a:endParaRPr kumimoji="0" lang="en-US" dirty="0"/>
           </a:p>
         </p:txBody>
       </p:sp>
@@ -3311,7 +3327,7 @@
           </a:lstStyle>
           <a:p>
             <a:pPr algn="ctr" eaLnBrk="1" latinLnBrk="0" hangingPunct="1"/>
-            <a:endParaRPr kumimoji="0" lang="en-US"/>
+            <a:endParaRPr kumimoji="0" lang="en-US" dirty="0"/>
           </a:p>
         </p:txBody>
       </p:sp>
@@ -3371,7 +3387,7 @@
           </a:lstStyle>
           <a:p>
             <a:pPr algn="ctr" eaLnBrk="1" latinLnBrk="0" hangingPunct="1"/>
-            <a:endParaRPr kumimoji="0" lang="en-US"/>
+            <a:endParaRPr kumimoji="0" lang="en-US" dirty="0"/>
           </a:p>
         </p:txBody>
       </p:sp>
@@ -3463,7 +3479,7 @@
           </a:lstStyle>
           <a:p>
             <a:pPr algn="ctr" eaLnBrk="1" latinLnBrk="0" hangingPunct="1"/>
-            <a:endParaRPr kumimoji="0" lang="en-US"/>
+            <a:endParaRPr kumimoji="0" lang="en-US" dirty="0"/>
           </a:p>
         </p:txBody>
       </p:sp>
@@ -3511,7 +3527,7 @@
           </a:lstStyle>
           <a:p>
             <a:pPr algn="ctr" eaLnBrk="1" latinLnBrk="0" hangingPunct="1"/>
-            <a:endParaRPr kumimoji="0" lang="en-US"/>
+            <a:endParaRPr kumimoji="0" lang="en-US" dirty="0"/>
           </a:p>
         </p:txBody>
       </p:sp>
@@ -3653,7 +3669,7 @@
               <a:rPr lang="en-US" smtClean="0"/>
               <a:t>8/10/2015</a:t>
             </a:fld>
-            <a:endParaRPr lang="en-US"/>
+            <a:endParaRPr lang="en-US" dirty="0"/>
           </a:p>
         </p:txBody>
       </p:sp>
@@ -3693,7 +3709,7 @@
             <a:extLst/>
           </a:lstStyle>
           <a:p>
-            <a:endParaRPr lang="en-US"/>
+            <a:endParaRPr lang="en-US" dirty="0"/>
           </a:p>
         </p:txBody>
       </p:sp>
@@ -3737,7 +3753,7 @@
               <a:rPr lang="en-US" smtClean="0"/>
               <a:t>‹#›</a:t>
             </a:fld>
-            <a:endParaRPr lang="en-US"/>
+            <a:endParaRPr lang="en-US" dirty="0"/>
           </a:p>
         </p:txBody>
       </p:sp>
@@ -3793,7 +3809,7 @@
           </a:lstStyle>
           <a:p>
             <a:pPr algn="ctr" eaLnBrk="1" latinLnBrk="0" hangingPunct="1"/>
-            <a:endParaRPr kumimoji="0" lang="en-US"/>
+            <a:endParaRPr kumimoji="0" lang="en-US" dirty="0"/>
           </a:p>
         </p:txBody>
       </p:sp>
@@ -4163,7 +4179,7 @@
           <a:lstStyle/>
           <a:p>
             <a:r>
-              <a:rPr lang="en-US" dirty="0" err="1" smtClean="0"/>
+              <a:rPr lang="en-US" dirty="0" smtClean="0"/>
               <a:t>PokemonTool</a:t>
             </a:r>
             <a:endParaRPr lang="en-US" dirty="0"/>
@@ -4187,19 +4203,7 @@
           <a:p>
             <a:r>
               <a:rPr lang="en-US" dirty="0" smtClean="0"/>
-              <a:t>by Myron </a:t>
-            </a:r>
-            <a:r>
-              <a:rPr lang="en-US" dirty="0" err="1" smtClean="0"/>
-              <a:t>Kolodiy</a:t>
-            </a:r>
-            <a:r>
-              <a:rPr lang="en-US" dirty="0" smtClean="0"/>
-              <a:t> and Boris </a:t>
-            </a:r>
-            <a:r>
-              <a:rPr lang="en-US" dirty="0" err="1" smtClean="0"/>
-              <a:t>Valerstein</a:t>
+              <a:t>by Myron Kolodiy and Boris Valerstein</a:t>
             </a:r>
             <a:endParaRPr lang="en-US" dirty="0"/>
           </a:p>
@@ -4292,8 +4296,8 @@
           <a:lstStyle/>
           <a:p>
             <a:r>
-              <a:rPr lang="en-US" dirty="0" err="1" smtClean="0"/>
-              <a:t>Pokemon</a:t>
+              <a:rPr lang="en-US" dirty="0" smtClean="0"/>
+              <a:t>Pokémon</a:t>
             </a:r>
             <a:endParaRPr lang="en-US" dirty="0"/>
           </a:p>
@@ -4319,8 +4323,8 @@
               <a:t>Fictional creatures called </a:t>
             </a:r>
             <a:r>
-              <a:rPr lang="en-US" dirty="0" err="1" smtClean="0"/>
-              <a:t>Pokemon</a:t>
+              <a:rPr lang="en-US" dirty="0" smtClean="0"/>
+              <a:t>Pokémon</a:t>
             </a:r>
             <a:endParaRPr lang="en-US" dirty="0" smtClean="0"/>
           </a:p>
@@ -4337,22 +4341,22 @@
               <a:t>Each </a:t>
             </a:r>
             <a:r>
-              <a:rPr lang="en-US" dirty="0" err="1" smtClean="0"/>
-              <a:t>Pokemon</a:t>
-            </a:r>
-            <a:r>
               <a:rPr lang="en-US" dirty="0" smtClean="0"/>
-              <a:t> has a card</a:t>
-            </a:r>
-          </a:p>
-          <a:p>
-            <a:r>
-              <a:rPr lang="en-US" dirty="0" err="1" smtClean="0"/>
-              <a:t>Pokemon</a:t>
+              <a:t>Pokémon </a:t>
             </a:r>
             <a:r>
               <a:rPr lang="en-US" dirty="0" smtClean="0"/>
-              <a:t> have</a:t>
+              <a:t>has a card</a:t>
+            </a:r>
+          </a:p>
+          <a:p>
+            <a:r>
+              <a:rPr lang="en-US" dirty="0" smtClean="0"/>
+              <a:t>Pokémon </a:t>
+            </a:r>
+            <a:r>
+              <a:rPr lang="en-US" dirty="0" smtClean="0"/>
+              <a:t>have</a:t>
             </a:r>
           </a:p>
           <a:p>
@@ -4461,19 +4465,23 @@
               <a:rPr lang="en-US" dirty="0" smtClean="0"/>
             </a:br>
             <a:r>
-              <a:rPr lang="en-US" dirty="0" err="1" smtClean="0"/>
-              <a:t>Pokemon</a:t>
-            </a:r>
-            <a:r>
               <a:rPr lang="en-US" dirty="0" smtClean="0"/>
-              <a:t> </a:t>
+              <a:t>Pokémon </a:t>
+            </a:r>
+            <a:r>
+              <a:rPr lang="en-US" dirty="0" smtClean="0"/>
+              <a:t/>
             </a:r>
             <a:br>
               <a:rPr lang="en-US" dirty="0" smtClean="0"/>
             </a:br>
             <a:r>
               <a:rPr lang="en-US" dirty="0" smtClean="0"/>
-              <a:t>The</a:t>
+              <a:t>Trading</a:t>
+            </a:r>
+            <a:r>
+              <a:rPr lang="en-US" dirty="0" smtClean="0"/>
+              <a:t/>
             </a:r>
             <a:br>
               <a:rPr lang="en-US" dirty="0" smtClean="0"/>
@@ -4804,19 +4812,52 @@
           </a:p>
           <a:p>
             <a:r>
-              <a:rPr lang="en-US" dirty="0" err="1" smtClean="0"/>
-              <a:t>Git</a:t>
-            </a:r>
-            <a:r>
               <a:rPr lang="en-US" dirty="0" smtClean="0"/>
-              <a:t> is a powerful collaborative tool</a:t>
-            </a:r>
-          </a:p>
-          <a:p>
+              <a:t>GitHub </a:t>
+            </a:r>
             <a:r>
               <a:rPr lang="en-US" dirty="0" smtClean="0"/>
-              <a:t>Android development is fun</a:t>
-            </a:r>
+              <a:t>is a powerful collaborative tool</a:t>
+            </a:r>
+          </a:p>
+          <a:p>
+            <a:r>
+              <a:rPr lang="en-US" dirty="0" smtClean="0"/>
+              <a:t>Android development is </a:t>
+            </a:r>
+            <a:r>
+              <a:rPr lang="en-US" dirty="0" smtClean="0"/>
+              <a:t>fun</a:t>
+            </a:r>
+          </a:p>
+          <a:p>
+            <a:pPr lvl="1"/>
+            <a:r>
+              <a:rPr lang="en-US" dirty="0" smtClean="0"/>
+              <a:t>Android is established yet evolving system</a:t>
+            </a:r>
+          </a:p>
+          <a:p>
+            <a:pPr lvl="1"/>
+            <a:r>
+              <a:rPr lang="en-US" dirty="0" smtClean="0"/>
+              <a:t>Perfecting UI is time consuming</a:t>
+            </a:r>
+          </a:p>
+          <a:p>
+            <a:pPr lvl="1"/>
+            <a:r>
+              <a:rPr lang="en-US" dirty="0" smtClean="0"/>
+              <a:t>Use Fragments</a:t>
+            </a:r>
+          </a:p>
+          <a:p>
+            <a:pPr lvl="1"/>
+            <a:r>
+              <a:rPr lang="en-US" dirty="0" smtClean="0"/>
+              <a:t>OS may destroy &amp; re-create the running app </a:t>
+            </a:r>
+            <a:endParaRPr lang="en-US" dirty="0" smtClean="0"/>
           </a:p>
           <a:p>
             <a:endParaRPr lang="en-US" dirty="0"/>

</xml_diff>